<commit_message>
Bugfix, Explanation for CP and QR
</commit_message>
<xml_diff>
--- a/Analysis drafts/Miscellaneous/Approach CP and QR.pptx
+++ b/Analysis drafts/Miscellaneous/Approach CP and QR.pptx
@@ -10,6 +10,9 @@
     <p:sldId id="257" r:id="rId4"/>
     <p:sldId id="258" r:id="rId5"/>
     <p:sldId id="259" r:id="rId6"/>
+    <p:sldId id="261" r:id="rId7"/>
+    <p:sldId id="262" r:id="rId8"/>
+    <p:sldId id="263" r:id="rId9"/>
   </p:sldIdLst>
   <p:sldSz cx="12192000" cy="6858000"/>
   <p:notesSz cx="6858000" cy="9144000"/>
@@ -124,6 +127,13 @@
             <p14:sldId id="259"/>
           </p14:sldIdLst>
         </p14:section>
+        <p14:section name="Quantile Regression (QR)" id="{814145CE-14D1-476C-9564-A06D7F503C69}">
+          <p14:sldIdLst>
+            <p14:sldId id="261"/>
+            <p14:sldId id="262"/>
+            <p14:sldId id="263"/>
+          </p14:sldIdLst>
+        </p14:section>
       </p14:sectionLst>
     </p:ext>
     <p:ext uri="{EFAFB233-063F-42B5-8137-9DF3F51BA10A}">
@@ -280,7 +290,7 @@
           <a:p>
             <a:fld id="{54F79FBF-84BC-4F50-89D9-07463085BBC4}" type="datetimeFigureOut">
               <a:rPr lang="en-GB" smtClean="0"/>
-              <a:t>08/12/2024</a:t>
+              <a:t>11/12/2024</a:t>
             </a:fld>
             <a:endParaRPr lang="en-GB"/>
           </a:p>
@@ -478,7 +488,7 @@
           <a:p>
             <a:fld id="{54F79FBF-84BC-4F50-89D9-07463085BBC4}" type="datetimeFigureOut">
               <a:rPr lang="en-GB" smtClean="0"/>
-              <a:t>08/12/2024</a:t>
+              <a:t>11/12/2024</a:t>
             </a:fld>
             <a:endParaRPr lang="en-GB"/>
           </a:p>
@@ -686,7 +696,7 @@
           <a:p>
             <a:fld id="{54F79FBF-84BC-4F50-89D9-07463085BBC4}" type="datetimeFigureOut">
               <a:rPr lang="en-GB" smtClean="0"/>
-              <a:t>08/12/2024</a:t>
+              <a:t>11/12/2024</a:t>
             </a:fld>
             <a:endParaRPr lang="en-GB"/>
           </a:p>
@@ -884,7 +894,7 @@
           <a:p>
             <a:fld id="{54F79FBF-84BC-4F50-89D9-07463085BBC4}" type="datetimeFigureOut">
               <a:rPr lang="en-GB" smtClean="0"/>
-              <a:t>08/12/2024</a:t>
+              <a:t>11/12/2024</a:t>
             </a:fld>
             <a:endParaRPr lang="en-GB"/>
           </a:p>
@@ -1159,7 +1169,7 @@
           <a:p>
             <a:fld id="{54F79FBF-84BC-4F50-89D9-07463085BBC4}" type="datetimeFigureOut">
               <a:rPr lang="en-GB" smtClean="0"/>
-              <a:t>08/12/2024</a:t>
+              <a:t>11/12/2024</a:t>
             </a:fld>
             <a:endParaRPr lang="en-GB"/>
           </a:p>
@@ -1424,7 +1434,7 @@
           <a:p>
             <a:fld id="{54F79FBF-84BC-4F50-89D9-07463085BBC4}" type="datetimeFigureOut">
               <a:rPr lang="en-GB" smtClean="0"/>
-              <a:t>08/12/2024</a:t>
+              <a:t>11/12/2024</a:t>
             </a:fld>
             <a:endParaRPr lang="en-GB"/>
           </a:p>
@@ -1836,7 +1846,7 @@
           <a:p>
             <a:fld id="{54F79FBF-84BC-4F50-89D9-07463085BBC4}" type="datetimeFigureOut">
               <a:rPr lang="en-GB" smtClean="0"/>
-              <a:t>08/12/2024</a:t>
+              <a:t>11/12/2024</a:t>
             </a:fld>
             <a:endParaRPr lang="en-GB"/>
           </a:p>
@@ -1977,7 +1987,7 @@
           <a:p>
             <a:fld id="{54F79FBF-84BC-4F50-89D9-07463085BBC4}" type="datetimeFigureOut">
               <a:rPr lang="en-GB" smtClean="0"/>
-              <a:t>08/12/2024</a:t>
+              <a:t>11/12/2024</a:t>
             </a:fld>
             <a:endParaRPr lang="en-GB"/>
           </a:p>
@@ -2090,7 +2100,7 @@
           <a:p>
             <a:fld id="{54F79FBF-84BC-4F50-89D9-07463085BBC4}" type="datetimeFigureOut">
               <a:rPr lang="en-GB" smtClean="0"/>
-              <a:t>08/12/2024</a:t>
+              <a:t>11/12/2024</a:t>
             </a:fld>
             <a:endParaRPr lang="en-GB"/>
           </a:p>
@@ -2401,7 +2411,7 @@
           <a:p>
             <a:fld id="{54F79FBF-84BC-4F50-89D9-07463085BBC4}" type="datetimeFigureOut">
               <a:rPr lang="en-GB" smtClean="0"/>
-              <a:t>08/12/2024</a:t>
+              <a:t>11/12/2024</a:t>
             </a:fld>
             <a:endParaRPr lang="en-GB"/>
           </a:p>
@@ -2689,7 +2699,7 @@
           <a:p>
             <a:fld id="{54F79FBF-84BC-4F50-89D9-07463085BBC4}" type="datetimeFigureOut">
               <a:rPr lang="en-GB" smtClean="0"/>
-              <a:t>08/12/2024</a:t>
+              <a:t>11/12/2024</a:t>
             </a:fld>
             <a:endParaRPr lang="en-GB"/>
           </a:p>
@@ -2930,7 +2940,7 @@
           <a:p>
             <a:fld id="{54F79FBF-84BC-4F50-89D9-07463085BBC4}" type="datetimeFigureOut">
               <a:rPr lang="en-GB" smtClean="0"/>
-              <a:t>08/12/2024</a:t>
+              <a:t>11/12/2024</a:t>
             </a:fld>
             <a:endParaRPr lang="en-GB"/>
           </a:p>
@@ -4418,6 +4428,319 @@
     <p:extLst>
       <p:ext uri="{BB962C8B-B14F-4D97-AF65-F5344CB8AC3E}">
         <p14:creationId xmlns:p14="http://schemas.microsoft.com/office/powerpoint/2010/main" val="3809268258"/>
+      </p:ext>
+    </p:extLst>
+  </p:cSld>
+  <p:clrMapOvr>
+    <a:masterClrMapping/>
+  </p:clrMapOvr>
+</p:sld>
+</file>
+
+<file path=ppt/slides/slide6.xml><?xml version="1.0" encoding="utf-8"?>
+<p:sld xmlns:a="http://schemas.openxmlformats.org/drawingml/2006/main" xmlns:r="http://schemas.openxmlformats.org/officeDocument/2006/relationships" xmlns:p="http://schemas.openxmlformats.org/presentationml/2006/main">
+  <p:cSld>
+    <p:spTree>
+      <p:nvGrpSpPr>
+        <p:cNvPr id="1" name="">
+          <a:extLst>
+            <a:ext uri="{FF2B5EF4-FFF2-40B4-BE49-F238E27FC236}">
+              <a16:creationId xmlns:a16="http://schemas.microsoft.com/office/drawing/2014/main" id="{4F0F99D4-8720-14E4-0183-F39A6487EA23}"/>
+            </a:ext>
+          </a:extLst>
+        </p:cNvPr>
+        <p:cNvGrpSpPr/>
+        <p:nvPr/>
+      </p:nvGrpSpPr>
+      <p:grpSpPr>
+        <a:xfrm>
+          <a:off x="0" y="0"/>
+          <a:ext cx="0" cy="0"/>
+          <a:chOff x="0" y="0"/>
+          <a:chExt cx="0" cy="0"/>
+        </a:xfrm>
+      </p:grpSpPr>
+      <p:sp>
+        <p:nvSpPr>
+          <p:cNvPr id="2" name="Title 1">
+            <a:extLst>
+              <a:ext uri="{FF2B5EF4-FFF2-40B4-BE49-F238E27FC236}">
+                <a16:creationId xmlns:a16="http://schemas.microsoft.com/office/drawing/2014/main" id="{8BC06A1A-5F1D-6DAE-5BBF-F1CF8CD0BCB8}"/>
+              </a:ext>
+            </a:extLst>
+          </p:cNvPr>
+          <p:cNvSpPr>
+            <a:spLocks noGrp="1"/>
+          </p:cNvSpPr>
+          <p:nvPr>
+            <p:ph type="ctrTitle"/>
+          </p:nvPr>
+        </p:nvSpPr>
+        <p:spPr/>
+        <p:txBody>
+          <a:bodyPr/>
+          <a:lstStyle/>
+          <a:p>
+            <a:r>
+              <a:rPr lang="de-DE" dirty="0"/>
+              <a:t>Quantile Regression (QR)</a:t>
+            </a:r>
+            <a:endParaRPr lang="en-GB" dirty="0"/>
+          </a:p>
+        </p:txBody>
+      </p:sp>
+    </p:spTree>
+    <p:extLst>
+      <p:ext uri="{BB962C8B-B14F-4D97-AF65-F5344CB8AC3E}">
+        <p14:creationId xmlns:p14="http://schemas.microsoft.com/office/powerpoint/2010/main" val="2639743240"/>
+      </p:ext>
+    </p:extLst>
+  </p:cSld>
+  <p:clrMapOvr>
+    <a:masterClrMapping/>
+  </p:clrMapOvr>
+</p:sld>
+</file>
+
+<file path=ppt/slides/slide7.xml><?xml version="1.0" encoding="utf-8"?>
+<p:sld xmlns:a="http://schemas.openxmlformats.org/drawingml/2006/main" xmlns:r="http://schemas.openxmlformats.org/officeDocument/2006/relationships" xmlns:p="http://schemas.openxmlformats.org/presentationml/2006/main">
+  <p:cSld>
+    <p:spTree>
+      <p:nvGrpSpPr>
+        <p:cNvPr id="1" name="">
+          <a:extLst>
+            <a:ext uri="{FF2B5EF4-FFF2-40B4-BE49-F238E27FC236}">
+              <a16:creationId xmlns:a16="http://schemas.microsoft.com/office/drawing/2014/main" id="{24AC3A1E-6D43-784B-6ED9-AB1A24672D7A}"/>
+            </a:ext>
+          </a:extLst>
+        </p:cNvPr>
+        <p:cNvGrpSpPr/>
+        <p:nvPr/>
+      </p:nvGrpSpPr>
+      <p:grpSpPr>
+        <a:xfrm>
+          <a:off x="0" y="0"/>
+          <a:ext cx="0" cy="0"/>
+          <a:chOff x="0" y="0"/>
+          <a:chExt cx="0" cy="0"/>
+        </a:xfrm>
+      </p:grpSpPr>
+      <p:pic>
+        <p:nvPicPr>
+          <p:cNvPr id="12" name="Picture 11">
+            <a:extLst>
+              <a:ext uri="{FF2B5EF4-FFF2-40B4-BE49-F238E27FC236}">
+                <a16:creationId xmlns:a16="http://schemas.microsoft.com/office/drawing/2014/main" id="{DF4CE4CA-3351-4992-6FB8-89E496D1E9D9}"/>
+              </a:ext>
+            </a:extLst>
+          </p:cNvPr>
+          <p:cNvPicPr>
+            <a:picLocks noChangeAspect="1"/>
+          </p:cNvPicPr>
+          <p:nvPr/>
+        </p:nvPicPr>
+        <p:blipFill>
+          <a:blip r:embed="rId2"/>
+          <a:stretch>
+            <a:fillRect/>
+          </a:stretch>
+        </p:blipFill>
+        <p:spPr>
+          <a:xfrm>
+            <a:off x="535081" y="871040"/>
+            <a:ext cx="11121837" cy="5943261"/>
+          </a:xfrm>
+          <a:prstGeom prst="rect">
+            <a:avLst/>
+          </a:prstGeom>
+        </p:spPr>
+      </p:pic>
+      <p:sp>
+        <p:nvSpPr>
+          <p:cNvPr id="15" name="Title 1">
+            <a:extLst>
+              <a:ext uri="{FF2B5EF4-FFF2-40B4-BE49-F238E27FC236}">
+                <a16:creationId xmlns:a16="http://schemas.microsoft.com/office/drawing/2014/main" id="{82109073-DBB6-E8B5-03E1-C8F0C23074CE}"/>
+              </a:ext>
+            </a:extLst>
+          </p:cNvPr>
+          <p:cNvSpPr>
+            <a:spLocks noGrp="1"/>
+          </p:cNvSpPr>
+          <p:nvPr>
+            <p:ph type="title"/>
+          </p:nvPr>
+        </p:nvSpPr>
+        <p:spPr>
+          <a:xfrm>
+            <a:off x="838200" y="165620"/>
+            <a:ext cx="10515600" cy="705420"/>
+          </a:xfrm>
+        </p:spPr>
+        <p:txBody>
+          <a:bodyPr/>
+          <a:lstStyle/>
+          <a:p>
+            <a:r>
+              <a:rPr lang="de-DE" dirty="0"/>
+              <a:t>Applied in </a:t>
+            </a:r>
+            <a:r>
+              <a:rPr lang="de-DE" dirty="0" err="1"/>
+              <a:t>pnbd-context</a:t>
+            </a:r>
+            <a:r>
+              <a:rPr lang="de-DE" dirty="0"/>
+              <a:t> (Part 1, </a:t>
+            </a:r>
+            <a:r>
+              <a:rPr lang="de-DE" dirty="0" err="1"/>
+              <a:t>old</a:t>
+            </a:r>
+            <a:r>
+              <a:rPr lang="de-DE" dirty="0"/>
+              <a:t> </a:t>
+            </a:r>
+            <a:r>
+              <a:rPr lang="de-DE" dirty="0" err="1"/>
+              <a:t>cohort</a:t>
+            </a:r>
+            <a:r>
+              <a:rPr lang="de-DE" dirty="0"/>
+              <a:t>)</a:t>
+            </a:r>
+            <a:endParaRPr lang="en-GB" dirty="0"/>
+          </a:p>
+        </p:txBody>
+      </p:sp>
+    </p:spTree>
+    <p:extLst>
+      <p:ext uri="{BB962C8B-B14F-4D97-AF65-F5344CB8AC3E}">
+        <p14:creationId xmlns:p14="http://schemas.microsoft.com/office/powerpoint/2010/main" val="3041920676"/>
+      </p:ext>
+    </p:extLst>
+  </p:cSld>
+  <p:clrMapOvr>
+    <a:masterClrMapping/>
+  </p:clrMapOvr>
+</p:sld>
+</file>
+
+<file path=ppt/slides/slide8.xml><?xml version="1.0" encoding="utf-8"?>
+<p:sld xmlns:a="http://schemas.openxmlformats.org/drawingml/2006/main" xmlns:r="http://schemas.openxmlformats.org/officeDocument/2006/relationships" xmlns:p="http://schemas.openxmlformats.org/presentationml/2006/main">
+  <p:cSld>
+    <p:spTree>
+      <p:nvGrpSpPr>
+        <p:cNvPr id="1" name="">
+          <a:extLst>
+            <a:ext uri="{FF2B5EF4-FFF2-40B4-BE49-F238E27FC236}">
+              <a16:creationId xmlns:a16="http://schemas.microsoft.com/office/drawing/2014/main" id="{B1CFECC6-9E35-D9D9-E2D6-626F8FB53F88}"/>
+            </a:ext>
+          </a:extLst>
+        </p:cNvPr>
+        <p:cNvGrpSpPr/>
+        <p:nvPr/>
+      </p:nvGrpSpPr>
+      <p:grpSpPr>
+        <a:xfrm>
+          <a:off x="0" y="0"/>
+          <a:ext cx="0" cy="0"/>
+          <a:chOff x="0" y="0"/>
+          <a:chExt cx="0" cy="0"/>
+        </a:xfrm>
+      </p:grpSpPr>
+      <p:sp>
+        <p:nvSpPr>
+          <p:cNvPr id="15" name="Title 1">
+            <a:extLst>
+              <a:ext uri="{FF2B5EF4-FFF2-40B4-BE49-F238E27FC236}">
+                <a16:creationId xmlns:a16="http://schemas.microsoft.com/office/drawing/2014/main" id="{14D85306-FF70-8B7C-9C16-853E5BA6267F}"/>
+              </a:ext>
+            </a:extLst>
+          </p:cNvPr>
+          <p:cNvSpPr>
+            <a:spLocks noGrp="1"/>
+          </p:cNvSpPr>
+          <p:nvPr>
+            <p:ph type="title"/>
+          </p:nvPr>
+        </p:nvSpPr>
+        <p:spPr>
+          <a:xfrm>
+            <a:off x="838200" y="165620"/>
+            <a:ext cx="10515600" cy="705420"/>
+          </a:xfrm>
+        </p:spPr>
+        <p:txBody>
+          <a:bodyPr/>
+          <a:lstStyle/>
+          <a:p>
+            <a:r>
+              <a:rPr lang="de-DE" dirty="0"/>
+              <a:t>Applied in </a:t>
+            </a:r>
+            <a:r>
+              <a:rPr lang="de-DE" dirty="0" err="1"/>
+              <a:t>pnbd-context</a:t>
+            </a:r>
+            <a:r>
+              <a:rPr lang="de-DE" dirty="0"/>
+              <a:t> (Part 2, </a:t>
+            </a:r>
+            <a:r>
+              <a:rPr lang="de-DE" dirty="0" err="1"/>
+              <a:t>new</a:t>
+            </a:r>
+            <a:r>
+              <a:rPr lang="de-DE" dirty="0"/>
+              <a:t> </a:t>
+            </a:r>
+            <a:r>
+              <a:rPr lang="de-DE" dirty="0" err="1"/>
+              <a:t>cohort</a:t>
+            </a:r>
+            <a:r>
+              <a:rPr lang="de-DE" dirty="0"/>
+              <a:t>)</a:t>
+            </a:r>
+            <a:endParaRPr lang="en-GB" dirty="0"/>
+          </a:p>
+        </p:txBody>
+      </p:sp>
+      <p:pic>
+        <p:nvPicPr>
+          <p:cNvPr id="3" name="Picture 2">
+            <a:extLst>
+              <a:ext uri="{FF2B5EF4-FFF2-40B4-BE49-F238E27FC236}">
+                <a16:creationId xmlns:a16="http://schemas.microsoft.com/office/drawing/2014/main" id="{0F7B7B50-27EB-3790-8693-4B2FE728D005}"/>
+              </a:ext>
+            </a:extLst>
+          </p:cNvPr>
+          <p:cNvPicPr>
+            <a:picLocks noChangeAspect="1"/>
+          </p:cNvPicPr>
+          <p:nvPr/>
+        </p:nvPicPr>
+        <p:blipFill>
+          <a:blip r:embed="rId2"/>
+          <a:stretch>
+            <a:fillRect/>
+          </a:stretch>
+        </p:blipFill>
+        <p:spPr>
+          <a:xfrm>
+            <a:off x="713624" y="749722"/>
+            <a:ext cx="10764752" cy="6077798"/>
+          </a:xfrm>
+          <a:prstGeom prst="rect">
+            <a:avLst/>
+          </a:prstGeom>
+        </p:spPr>
+      </p:pic>
+    </p:spTree>
+    <p:extLst>
+      <p:ext uri="{BB962C8B-B14F-4D97-AF65-F5344CB8AC3E}">
+        <p14:creationId xmlns:p14="http://schemas.microsoft.com/office/powerpoint/2010/main" val="2698294118"/>
       </p:ext>
     </p:extLst>
   </p:cSld>

</xml_diff>